<commit_message>
updating slides for event based programming
</commit_message>
<xml_diff>
--- a/ClassMaterials/EventBasedProgramming/Slides/Part1-InterfaceReview.pptx
+++ b/ClassMaterials/EventBasedProgramming/Slides/Part1-InterfaceReview.pptx
@@ -169,6 +169,30 @@
 <file path=ppt/changesInfos/changesInfo1.xml><?xml version="1.0" encoding="utf-8"?>
 <pc:chgInfo xmlns:a="http://schemas.openxmlformats.org/drawingml/2006/main" xmlns:r="http://schemas.openxmlformats.org/officeDocument/2006/relationships" xmlns:ac="http://schemas.microsoft.com/office/drawing/2013/main/command" xmlns:pc="http://schemas.microsoft.com/office/powerpoint/2013/main/command">
   <pc:docChgLst>
+    <pc:chgData name="Yoder, Jason" userId="28f4d4d8-da04-4f86-b14d-a21675737bc5" providerId="ADAL" clId="{7CA038F7-D685-4C83-9D06-CE4A93A3B711}"/>
+    <pc:docChg chg="modSld">
+      <pc:chgData name="Yoder, Jason" userId="28f4d4d8-da04-4f86-b14d-a21675737bc5" providerId="ADAL" clId="{7CA038F7-D685-4C83-9D06-CE4A93A3B711}" dt="2023-11-21T17:24:19.445" v="54" actId="6549"/>
+      <pc:docMkLst>
+        <pc:docMk/>
+      </pc:docMkLst>
+      <pc:sldChg chg="modSp mod">
+        <pc:chgData name="Yoder, Jason" userId="28f4d4d8-da04-4f86-b14d-a21675737bc5" providerId="ADAL" clId="{7CA038F7-D685-4C83-9D06-CE4A93A3B711}" dt="2023-11-21T17:24:19.445" v="54" actId="6549"/>
+        <pc:sldMkLst>
+          <pc:docMk/>
+          <pc:sldMk cId="0" sldId="256"/>
+        </pc:sldMkLst>
+        <pc:spChg chg="mod">
+          <ac:chgData name="Yoder, Jason" userId="28f4d4d8-da04-4f86-b14d-a21675737bc5" providerId="ADAL" clId="{7CA038F7-D685-4C83-9D06-CE4A93A3B711}" dt="2023-11-21T17:24:19.445" v="54" actId="6549"/>
+          <ac:spMkLst>
+            <pc:docMk/>
+            <pc:sldMk cId="0" sldId="256"/>
+            <ac:spMk id="5" creationId="{B3CCB087-C83B-2E4F-B6C1-A2651B16F44F}"/>
+          </ac:spMkLst>
+        </pc:spChg>
+      </pc:sldChg>
+    </pc:docChg>
+  </pc:docChgLst>
+  <pc:docChgLst>
     <pc:chgData name="Korinek, Adam" userId="S::korineaj@rose-hulman.edu::a98ddd77-be9c-4186-9ea9-5e52026b75b2" providerId="AD" clId="Web-{8499BA59-1E0C-4156-BC6F-91B9428AF3F6}"/>
     <pc:docChg chg="modSld">
       <pc:chgData name="Korinek, Adam" userId="S::korineaj@rose-hulman.edu::a98ddd77-be9c-4186-9ea9-5e52026b75b2" providerId="AD" clId="Web-{8499BA59-1E0C-4156-BC6F-91B9428AF3F6}" dt="2021-10-07T12:50:39.432" v="4" actId="20577"/>
@@ -187,30 +211,6 @@
             <pc:docMk/>
             <pc:sldMk cId="1512040240" sldId="380"/>
             <ac:spMk id="3" creationId="{00000000-0000-0000-0000-000000000000}"/>
-          </ac:spMkLst>
-        </pc:spChg>
-      </pc:sldChg>
-    </pc:docChg>
-  </pc:docChgLst>
-  <pc:docChgLst>
-    <pc:chgData name="Yoder, Jason" userId="28f4d4d8-da04-4f86-b14d-a21675737bc5" providerId="ADAL" clId="{7CA038F7-D685-4C83-9D06-CE4A93A3B711}"/>
-    <pc:docChg chg="modSld">
-      <pc:chgData name="Yoder, Jason" userId="28f4d4d8-da04-4f86-b14d-a21675737bc5" providerId="ADAL" clId="{7CA038F7-D685-4C83-9D06-CE4A93A3B711}" dt="2023-11-21T17:24:19.445" v="54" actId="6549"/>
-      <pc:docMkLst>
-        <pc:docMk/>
-      </pc:docMkLst>
-      <pc:sldChg chg="modSp mod">
-        <pc:chgData name="Yoder, Jason" userId="28f4d4d8-da04-4f86-b14d-a21675737bc5" providerId="ADAL" clId="{7CA038F7-D685-4C83-9D06-CE4A93A3B711}" dt="2023-11-21T17:24:19.445" v="54" actId="6549"/>
-        <pc:sldMkLst>
-          <pc:docMk/>
-          <pc:sldMk cId="0" sldId="256"/>
-        </pc:sldMkLst>
-        <pc:spChg chg="mod">
-          <ac:chgData name="Yoder, Jason" userId="28f4d4d8-da04-4f86-b14d-a21675737bc5" providerId="ADAL" clId="{7CA038F7-D685-4C83-9D06-CE4A93A3B711}" dt="2023-11-21T17:24:19.445" v="54" actId="6549"/>
-          <ac:spMkLst>
-            <pc:docMk/>
-            <pc:sldMk cId="0" sldId="256"/>
-            <ac:spMk id="5" creationId="{B3CCB087-C83B-2E4F-B6C1-A2651B16F44F}"/>
           </ac:spMkLst>
         </pc:spChg>
       </pc:sldChg>
@@ -336,7 +336,7 @@
               <a:pPr>
                 <a:defRPr/>
               </a:pPr>
-              <a:t>11/21/2023</a:t>
+              <a:t>1/15/2024</a:t>
             </a:fld>
             <a:endParaRPr lang="en-US"/>
           </a:p>
@@ -571,7 +571,7 @@
               <a:pPr>
                 <a:defRPr/>
               </a:pPr>
-              <a:t>11/21/2023</a:t>
+              <a:t>1/15/2024</a:t>
             </a:fld>
             <a:endParaRPr lang="en-US"/>
           </a:p>
@@ -954,7 +954,7 @@
           </a:ln>
           <a:extLst>
             <a:ext uri="{909E8E84-426E-40dd-AFC4-6F175D3DCCD1}">
-              <a14:hiddenFill xmlns="" xmlns:a14="http://schemas.microsoft.com/office/drawing/2010/main">
+              <a14:hiddenFill xmlns:a14="http://schemas.microsoft.com/office/drawing/2010/main" xmlns="">
                 <a:solidFill>
                   <a:srgbClr val="FFFFFF"/>
                 </a:solidFill>
@@ -978,14 +978,14 @@
           <a:ln/>
           <a:extLst>
             <a:ext uri="{909E8E84-426E-40dd-AFC4-6F175D3DCCD1}">
-              <a14:hiddenFill xmlns="" xmlns:a14="http://schemas.microsoft.com/office/drawing/2010/main">
+              <a14:hiddenFill xmlns:a14="http://schemas.microsoft.com/office/drawing/2010/main" xmlns="">
                 <a:solidFill>
                   <a:srgbClr val="FFFFFF"/>
                 </a:solidFill>
               </a14:hiddenFill>
             </a:ext>
             <a:ext uri="{91240B29-F687-4f45-9708-019B960494DF}">
-              <a14:hiddenLine xmlns="" xmlns:a14="http://schemas.microsoft.com/office/drawing/2010/main" w="9525">
+              <a14:hiddenLine xmlns:a14="http://schemas.microsoft.com/office/drawing/2010/main" xmlns="" w="9525">
                 <a:solidFill>
                   <a:srgbClr val="000000"/>
                 </a:solidFill>
@@ -1066,14 +1066,14 @@
           <a:ln/>
           <a:extLst>
             <a:ext uri="{909E8E84-426E-40dd-AFC4-6F175D3DCCD1}">
-              <a14:hiddenFill xmlns="" xmlns:a14="http://schemas.microsoft.com/office/drawing/2010/main">
+              <a14:hiddenFill xmlns:a14="http://schemas.microsoft.com/office/drawing/2010/main" xmlns="">
                 <a:solidFill>
                   <a:srgbClr val="FFFFFF"/>
                 </a:solidFill>
               </a14:hiddenFill>
             </a:ext>
             <a:ext uri="{91240B29-F687-4f45-9708-019B960494DF}">
-              <a14:hiddenLine xmlns="" xmlns:a14="http://schemas.microsoft.com/office/drawing/2010/main" w="9525">
+              <a14:hiddenLine xmlns:a14="http://schemas.microsoft.com/office/drawing/2010/main" xmlns="" w="9525">
                 <a:solidFill>
                   <a:srgbClr val="000000"/>
                 </a:solidFill>
@@ -1483,22 +1483,22 @@
           <a:lstStyle/>
           <a:p>
             <a:r>
-              <a:rPr lang="en-US"/>
-              <a:t>Coupling,</a:t>
-            </a:r>
-            <a:r>
-              <a:rPr lang="en-US" baseline="0"/>
+              <a:rPr lang="en-US" dirty="0"/>
+              <a:t>Correct answer is Coupling,</a:t>
+            </a:r>
+            <a:r>
+              <a:rPr lang="en-US" baseline="0" dirty="0"/>
               <a:t> a</a:t>
             </a:r>
             <a:r>
-              <a:rPr lang="en-US"/>
+              <a:rPr lang="en-US" dirty="0"/>
               <a:t>lso</a:t>
             </a:r>
             <a:r>
-              <a:rPr lang="en-US" baseline="0"/>
-              <a:t> dependencies</a:t>
-            </a:r>
-            <a:endParaRPr lang="en-US"/>
+              <a:rPr lang="en-US" baseline="0" dirty="0"/>
+              <a:t> dependencies would be a good answer</a:t>
+            </a:r>
+            <a:endParaRPr lang="en-US" dirty="0"/>
           </a:p>
         </p:txBody>
       </p:sp>
@@ -1819,7 +1819,7 @@
               <a:pPr>
                 <a:defRPr/>
               </a:pPr>
-              <a:t>Tuesday, November 21, 2023</a:t>
+              <a:t>Monday, January 15, 2024</a:t>
             </a:fld>
             <a:endParaRPr lang="en-US"/>
           </a:p>
@@ -2002,7 +2002,7 @@
               <a:pPr>
                 <a:defRPr/>
               </a:pPr>
-              <a:t>Tuesday, November 21, 2023</a:t>
+              <a:t>Monday, January 15, 2024</a:t>
             </a:fld>
             <a:endParaRPr lang="en-US"/>
           </a:p>
@@ -2195,7 +2195,7 @@
               <a:pPr>
                 <a:defRPr/>
               </a:pPr>
-              <a:t>Tuesday, November 21, 2023</a:t>
+              <a:t>Monday, January 15, 2024</a:t>
             </a:fld>
             <a:endParaRPr lang="en-US"/>
           </a:p>
@@ -2378,7 +2378,7 @@
               <a:pPr>
                 <a:defRPr/>
               </a:pPr>
-              <a:t>Tuesday, November 21, 2023</a:t>
+              <a:t>Monday, January 15, 2024</a:t>
             </a:fld>
             <a:endParaRPr lang="en-US"/>
           </a:p>
@@ -2638,7 +2638,7 @@
               <a:pPr>
                 <a:defRPr/>
               </a:pPr>
-              <a:t>Tuesday, November 21, 2023</a:t>
+              <a:t>Monday, January 15, 2024</a:t>
             </a:fld>
             <a:endParaRPr lang="en-US"/>
           </a:p>
@@ -2938,7 +2938,7 @@
               <a:pPr>
                 <a:defRPr/>
               </a:pPr>
-              <a:t>Tuesday, November 21, 2023</a:t>
+              <a:t>Monday, January 15, 2024</a:t>
             </a:fld>
             <a:endParaRPr lang="en-US"/>
           </a:p>
@@ -3372,7 +3372,7 @@
               <a:pPr>
                 <a:defRPr/>
               </a:pPr>
-              <a:t>Tuesday, November 21, 2023</a:t>
+              <a:t>Monday, January 15, 2024</a:t>
             </a:fld>
             <a:endParaRPr lang="en-US"/>
           </a:p>
@@ -3504,7 +3504,7 @@
               <a:pPr>
                 <a:defRPr/>
               </a:pPr>
-              <a:t>Tuesday, November 21, 2023</a:t>
+              <a:t>Monday, January 15, 2024</a:t>
             </a:fld>
             <a:endParaRPr lang="en-US"/>
           </a:p>
@@ -3614,7 +3614,7 @@
               <a:pPr>
                 <a:defRPr/>
               </a:pPr>
-              <a:t>Tuesday, November 21, 2023</a:t>
+              <a:t>Monday, January 15, 2024</a:t>
             </a:fld>
             <a:endParaRPr lang="en-US"/>
           </a:p>
@@ -3904,7 +3904,7 @@
               <a:pPr>
                 <a:defRPr/>
               </a:pPr>
-              <a:t>Tuesday, November 21, 2023</a:t>
+              <a:t>Monday, January 15, 2024</a:t>
             </a:fld>
             <a:endParaRPr lang="en-US"/>
           </a:p>
@@ -4171,7 +4171,7 @@
               <a:pPr>
                 <a:defRPr/>
               </a:pPr>
-              <a:t>Tuesday, November 21, 2023</a:t>
+              <a:t>Monday, January 15, 2024</a:t>
             </a:fld>
             <a:endParaRPr lang="en-US"/>
           </a:p>
@@ -4397,7 +4397,7 @@
               <a:pPr>
                 <a:defRPr/>
               </a:pPr>
-              <a:t>Tuesday, November 21, 2023</a:t>
+              <a:t>Monday, January 15, 2024</a:t>
             </a:fld>
             <a:endParaRPr lang="en-US"/>
           </a:p>
@@ -7015,7 +7015,7 @@
               <a:buNone/>
             </a:pPr>
             <a:r>
-              <a:rPr lang="en-US"/>
+              <a:rPr lang="en-US" dirty="0"/>
               <a:t>Using interfaces can help reduce _______ between classes.</a:t>
             </a:r>
           </a:p>
@@ -7025,12 +7025,9 @@
               <a:buAutoNum type="arabicPeriod"/>
             </a:pPr>
             <a:r>
-              <a:rPr lang="en-US"/>
-              <a:t>Coupling Yes</a:t>
-            </a:r>
-            <a:endParaRPr lang="en-US">
-              <a:cs typeface="Calibri"/>
-            </a:endParaRPr>
+              <a:rPr lang="en-US" dirty="0"/>
+              <a:t>Coupling </a:t>
+            </a:r>
           </a:p>
           <a:p>
             <a:pPr marL="914400" lvl="1" indent="-514350">
@@ -7038,7 +7035,7 @@
               <a:buAutoNum type="arabicPeriod"/>
             </a:pPr>
             <a:r>
-              <a:rPr lang="en-US"/>
+              <a:rPr lang="en-US" dirty="0"/>
               <a:t>Cohesion</a:t>
             </a:r>
           </a:p>
@@ -7048,7 +7045,7 @@
               <a:buAutoNum type="arabicPeriod"/>
             </a:pPr>
             <a:r>
-              <a:rPr lang="en-US"/>
+              <a:rPr lang="en-US" dirty="0"/>
               <a:t>Encapsulation</a:t>
             </a:r>
           </a:p>
@@ -7058,7 +7055,7 @@
               <a:buAutoNum type="arabicPeriod"/>
             </a:pPr>
             <a:r>
-              <a:rPr lang="en-US"/>
+              <a:rPr lang="en-US" dirty="0"/>
               <a:t>Polymorphism</a:t>
             </a:r>
           </a:p>
@@ -7067,14 +7064,14 @@
               <a:buFont typeface="+mj-lt"/>
               <a:buAutoNum type="alphaLcPeriod"/>
             </a:pPr>
-            <a:endParaRPr lang="en-US"/>
+            <a:endParaRPr lang="en-US" dirty="0"/>
           </a:p>
           <a:p>
             <a:pPr marL="0" indent="0">
               <a:buNone/>
             </a:pPr>
             <a:r>
-              <a:rPr lang="en-US"/>
+              <a:rPr lang="en-US" dirty="0"/>
               <a:t>We need interfaces for event-based programming in Java.</a:t>
             </a:r>
           </a:p>
@@ -8182,21 +8179,6 @@
 </file>
 
 <file path=customXml/item1.xml><?xml version="1.0" encoding="utf-8"?>
-<?mso-contentType ?>
-<FormTemplates xmlns="http://schemas.microsoft.com/sharepoint/v3/contenttype/forms">
-  <Display>DocumentLibraryForm</Display>
-  <Edit>DocumentLibraryForm</Edit>
-  <New>DocumentLibraryForm</New>
-</FormTemplates>
-</file>
-
-<file path=customXml/item2.xml><?xml version="1.0" encoding="utf-8"?>
-<p:properties xmlns:p="http://schemas.microsoft.com/office/2006/metadata/properties" xmlns:xsi="http://www.w3.org/2001/XMLSchema-instance" xmlns:pc="http://schemas.microsoft.com/office/infopath/2007/PartnerControls">
-  <documentManagement/>
-</p:properties>
-</file>
-
-<file path=customXml/item3.xml><?xml version="1.0" encoding="utf-8"?>
 <ct:contentTypeSchema xmlns:ct="http://schemas.microsoft.com/office/2006/metadata/contentType" xmlns:ma="http://schemas.microsoft.com/office/2006/metadata/properties/metaAttributes" ct:_="" ma:_="" ma:contentTypeName="Document" ma:contentTypeID="0x0101001570BCAAD2E4294F9443DCB038A55380" ma:contentTypeVersion="8" ma:contentTypeDescription="Create a new document." ma:contentTypeScope="" ma:versionID="9523c79d6bab9e2ad858b5223ec5ed94">
   <xsd:schema xmlns:xsd="http://www.w3.org/2001/XMLSchema" xmlns:xs="http://www.w3.org/2001/XMLSchema" xmlns:p="http://schemas.microsoft.com/office/2006/metadata/properties" xmlns:ns2="201674f6-2bdd-4f13-ba1e-424e4aa70473" targetNamespace="http://schemas.microsoft.com/office/2006/metadata/properties" ma:root="true" ma:fieldsID="587afc94f70b507ec5be5f4d78229b0b" ns2:_="">
     <xsd:import namespace="201674f6-2bdd-4f13-ba1e-424e4aa70473"/>
@@ -8366,24 +8348,22 @@
 </ct:contentTypeSchema>
 </file>
 
-<file path=customXml/itemProps1.xml><?xml version="1.0" encoding="utf-8"?>
-<ds:datastoreItem xmlns:ds="http://schemas.openxmlformats.org/officeDocument/2006/customXml" ds:itemID="{3CB8179A-3C5B-4DD5-887D-2568AF4E10D8}">
-  <ds:schemaRefs>
-    <ds:schemaRef ds:uri="http://schemas.microsoft.com/sharepoint/v3/contenttype/forms"/>
-  </ds:schemaRefs>
-</ds:datastoreItem>
+<file path=customXml/item2.xml><?xml version="1.0" encoding="utf-8"?>
+<p:properties xmlns:p="http://schemas.microsoft.com/office/2006/metadata/properties" xmlns:xsi="http://www.w3.org/2001/XMLSchema-instance" xmlns:pc="http://schemas.microsoft.com/office/infopath/2007/PartnerControls">
+  <documentManagement/>
+</p:properties>
 </file>
 
-<file path=customXml/itemProps2.xml><?xml version="1.0" encoding="utf-8"?>
-<ds:datastoreItem xmlns:ds="http://schemas.openxmlformats.org/officeDocument/2006/customXml" ds:itemID="{53C409AC-F4A9-48A5-9842-B8C391BC6DED}">
-  <ds:schemaRefs>
-    <ds:schemaRef ds:uri="http://schemas.microsoft.com/office/2006/metadata/properties"/>
-    <ds:schemaRef ds:uri="http://schemas.microsoft.com/office/infopath/2007/PartnerControls"/>
-  </ds:schemaRefs>
-</ds:datastoreItem>
+<file path=customXml/item3.xml><?xml version="1.0" encoding="utf-8"?>
+<?mso-contentType ?>
+<FormTemplates xmlns="http://schemas.microsoft.com/sharepoint/v3/contenttype/forms">
+  <Display>DocumentLibraryForm</Display>
+  <Edit>DocumentLibraryForm</Edit>
+  <New>DocumentLibraryForm</New>
+</FormTemplates>
 </file>
 
-<file path=customXml/itemProps3.xml><?xml version="1.0" encoding="utf-8"?>
+<file path=customXml/itemProps1.xml><?xml version="1.0" encoding="utf-8"?>
 <ds:datastoreItem xmlns:ds="http://schemas.openxmlformats.org/officeDocument/2006/customXml" ds:itemID="{AD498D5E-C53E-4B60-A301-18929654B5F8}">
   <ds:schemaRefs>
     <ds:schemaRef ds:uri="http://schemas.microsoft.com/office/2006/metadata/contentType"/>
@@ -8399,4 +8379,21 @@
     <ds:schemaRef ds:uri="http://schemas.microsoft.com/internal/obd"/>
   </ds:schemaRefs>
 </ds:datastoreItem>
+</file>
+
+<file path=customXml/itemProps2.xml><?xml version="1.0" encoding="utf-8"?>
+<ds:datastoreItem xmlns:ds="http://schemas.openxmlformats.org/officeDocument/2006/customXml" ds:itemID="{53C409AC-F4A9-48A5-9842-B8C391BC6DED}">
+  <ds:schemaRefs>
+    <ds:schemaRef ds:uri="http://schemas.microsoft.com/office/2006/metadata/properties"/>
+    <ds:schemaRef ds:uri="http://schemas.microsoft.com/office/infopath/2007/PartnerControls"/>
+  </ds:schemaRefs>
+</ds:datastoreItem>
+</file>
+
+<file path=customXml/itemProps3.xml><?xml version="1.0" encoding="utf-8"?>
+<ds:datastoreItem xmlns:ds="http://schemas.openxmlformats.org/officeDocument/2006/customXml" ds:itemID="{3CB8179A-3C5B-4DD5-887D-2568AF4E10D8}">
+  <ds:schemaRefs>
+    <ds:schemaRef ds:uri="http://schemas.microsoft.com/sharepoint/v3/contenttype/forms"/>
+  </ds:schemaRefs>
+</ds:datastoreItem>
 </file>
</xml_diff>